<commit_message>
add initial client project
</commit_message>
<xml_diff>
--- a/icon/icon_factory.pptx
+++ b/icon/icon_factory.pptx
@@ -105,6 +105,11 @@
       </a:defRPr>
     </a:lvl9pPr>
   </p:defaultTextStyle>
+  <p:extLst>
+    <p:ext uri="{EFAFB233-063F-42B5-8137-9DF3F51BA10A}">
+      <p15:sldGuideLst xmlns:p15="http://schemas.microsoft.com/office/powerpoint/2012/main"/>
+    </p:ext>
+  </p:extLst>
 </p:presentation>
 </file>
 
@@ -255,7 +260,7 @@
           <a:p>
             <a:fld id="{BE18AF5A-D449-4F61-9B99-972E7C433989}" type="datetimeFigureOut">
               <a:rPr lang="ko-KR" altLang="en-US" smtClean="0"/>
-              <a:t>2021-04-01</a:t>
+              <a:t>2021-08-30</a:t>
             </a:fld>
             <a:endParaRPr lang="ko-KR" altLang="en-US"/>
           </a:p>
@@ -453,7 +458,7 @@
           <a:p>
             <a:fld id="{BE18AF5A-D449-4F61-9B99-972E7C433989}" type="datetimeFigureOut">
               <a:rPr lang="ko-KR" altLang="en-US" smtClean="0"/>
-              <a:t>2021-04-01</a:t>
+              <a:t>2021-08-30</a:t>
             </a:fld>
             <a:endParaRPr lang="ko-KR" altLang="en-US"/>
           </a:p>
@@ -661,7 +666,7 @@
           <a:p>
             <a:fld id="{BE18AF5A-D449-4F61-9B99-972E7C433989}" type="datetimeFigureOut">
               <a:rPr lang="ko-KR" altLang="en-US" smtClean="0"/>
-              <a:t>2021-04-01</a:t>
+              <a:t>2021-08-30</a:t>
             </a:fld>
             <a:endParaRPr lang="ko-KR" altLang="en-US"/>
           </a:p>
@@ -859,7 +864,7 @@
           <a:p>
             <a:fld id="{BE18AF5A-D449-4F61-9B99-972E7C433989}" type="datetimeFigureOut">
               <a:rPr lang="ko-KR" altLang="en-US" smtClean="0"/>
-              <a:t>2021-04-01</a:t>
+              <a:t>2021-08-30</a:t>
             </a:fld>
             <a:endParaRPr lang="ko-KR" altLang="en-US"/>
           </a:p>
@@ -1134,7 +1139,7 @@
           <a:p>
             <a:fld id="{BE18AF5A-D449-4F61-9B99-972E7C433989}" type="datetimeFigureOut">
               <a:rPr lang="ko-KR" altLang="en-US" smtClean="0"/>
-              <a:t>2021-04-01</a:t>
+              <a:t>2021-08-30</a:t>
             </a:fld>
             <a:endParaRPr lang="ko-KR" altLang="en-US"/>
           </a:p>
@@ -1399,7 +1404,7 @@
           <a:p>
             <a:fld id="{BE18AF5A-D449-4F61-9B99-972E7C433989}" type="datetimeFigureOut">
               <a:rPr lang="ko-KR" altLang="en-US" smtClean="0"/>
-              <a:t>2021-04-01</a:t>
+              <a:t>2021-08-30</a:t>
             </a:fld>
             <a:endParaRPr lang="ko-KR" altLang="en-US"/>
           </a:p>
@@ -1811,7 +1816,7 @@
           <a:p>
             <a:fld id="{BE18AF5A-D449-4F61-9B99-972E7C433989}" type="datetimeFigureOut">
               <a:rPr lang="ko-KR" altLang="en-US" smtClean="0"/>
-              <a:t>2021-04-01</a:t>
+              <a:t>2021-08-30</a:t>
             </a:fld>
             <a:endParaRPr lang="ko-KR" altLang="en-US"/>
           </a:p>
@@ -1952,7 +1957,7 @@
           <a:p>
             <a:fld id="{BE18AF5A-D449-4F61-9B99-972E7C433989}" type="datetimeFigureOut">
               <a:rPr lang="ko-KR" altLang="en-US" smtClean="0"/>
-              <a:t>2021-04-01</a:t>
+              <a:t>2021-08-30</a:t>
             </a:fld>
             <a:endParaRPr lang="ko-KR" altLang="en-US"/>
           </a:p>
@@ -2065,7 +2070,7 @@
           <a:p>
             <a:fld id="{BE18AF5A-D449-4F61-9B99-972E7C433989}" type="datetimeFigureOut">
               <a:rPr lang="ko-KR" altLang="en-US" smtClean="0"/>
-              <a:t>2021-04-01</a:t>
+              <a:t>2021-08-30</a:t>
             </a:fld>
             <a:endParaRPr lang="ko-KR" altLang="en-US"/>
           </a:p>
@@ -2376,7 +2381,7 @@
           <a:p>
             <a:fld id="{BE18AF5A-D449-4F61-9B99-972E7C433989}" type="datetimeFigureOut">
               <a:rPr lang="ko-KR" altLang="en-US" smtClean="0"/>
-              <a:t>2021-04-01</a:t>
+              <a:t>2021-08-30</a:t>
             </a:fld>
             <a:endParaRPr lang="ko-KR" altLang="en-US"/>
           </a:p>
@@ -2664,7 +2669,7 @@
           <a:p>
             <a:fld id="{BE18AF5A-D449-4F61-9B99-972E7C433989}" type="datetimeFigureOut">
               <a:rPr lang="ko-KR" altLang="en-US" smtClean="0"/>
-              <a:t>2021-04-01</a:t>
+              <a:t>2021-08-30</a:t>
             </a:fld>
             <a:endParaRPr lang="ko-KR" altLang="en-US"/>
           </a:p>
@@ -2905,7 +2910,7 @@
           <a:p>
             <a:fld id="{BE18AF5A-D449-4F61-9B99-972E7C433989}" type="datetimeFigureOut">
               <a:rPr lang="ko-KR" altLang="en-US" smtClean="0"/>
-              <a:t>2021-04-01</a:t>
+              <a:t>2021-08-30</a:t>
             </a:fld>
             <a:endParaRPr lang="ko-KR" altLang="en-US"/>
           </a:p>
@@ -5525,6 +5530,15 @@
           <a:blip r:embed="rId2">
             <a:alphaModFix amt="35000"/>
             <a:extLst>
+              <a:ext uri="{BEBA8EAE-BF5A-486C-A8C5-ECC9F3942E4B}">
+                <a14:imgProps xmlns:a14="http://schemas.microsoft.com/office/drawing/2010/main">
+                  <a14:imgLayer r:embed="rId3">
+                    <a14:imgEffect>
+                      <a14:artisticMarker/>
+                    </a14:imgEffect>
+                  </a14:imgLayer>
+                </a14:imgProps>
+              </a:ext>
               <a:ext uri="{28A0092B-C50C-407E-A947-70E740481C1C}">
                 <a14:useLocalDpi xmlns:a14="http://schemas.microsoft.com/office/drawing/2010/main" val="0"/>
               </a:ext>

</xml_diff>